<commit_message>
Updated Sample gen code for CLI 0.2.1
</commit_message>
<xml_diff>
--- a/ScalableMLModelOnWebAPI/Diagrams.pptx
+++ b/ScalableMLModelOnWebAPI/Diagrams.pptx
@@ -199,7 +199,7 @@
           <a:p>
             <a:fld id="{670992A0-18AF-483C-9CA5-5E744E1510F2}" type="datetimeFigureOut">
               <a:rPr lang="en-US" smtClean="0"/>
-              <a:t>3/20/2019</a:t>
+              <a:t>3/23/2019</a:t>
             </a:fld>
             <a:endParaRPr lang="en-US"/>
           </a:p>
@@ -865,7 +865,7 @@
           <a:p>
             <a:fld id="{D2F8B268-8E0F-4DD6-826C-55B488544B26}" type="datetimeFigureOut">
               <a:rPr lang="en-US" smtClean="0"/>
-              <a:t>3/20/2019</a:t>
+              <a:t>3/23/2019</a:t>
             </a:fld>
             <a:endParaRPr lang="en-US"/>
           </a:p>
@@ -1063,7 +1063,7 @@
           <a:p>
             <a:fld id="{D2F8B268-8E0F-4DD6-826C-55B488544B26}" type="datetimeFigureOut">
               <a:rPr lang="en-US" smtClean="0"/>
-              <a:t>3/20/2019</a:t>
+              <a:t>3/23/2019</a:t>
             </a:fld>
             <a:endParaRPr lang="en-US"/>
           </a:p>
@@ -1271,7 +1271,7 @@
           <a:p>
             <a:fld id="{D2F8B268-8E0F-4DD6-826C-55B488544B26}" type="datetimeFigureOut">
               <a:rPr lang="en-US" smtClean="0"/>
-              <a:t>3/20/2019</a:t>
+              <a:t>3/23/2019</a:t>
             </a:fld>
             <a:endParaRPr lang="en-US"/>
           </a:p>
@@ -1469,7 +1469,7 @@
           <a:p>
             <a:fld id="{D2F8B268-8E0F-4DD6-826C-55B488544B26}" type="datetimeFigureOut">
               <a:rPr lang="en-US" smtClean="0"/>
-              <a:t>3/20/2019</a:t>
+              <a:t>3/23/2019</a:t>
             </a:fld>
             <a:endParaRPr lang="en-US"/>
           </a:p>
@@ -1744,7 +1744,7 @@
           <a:p>
             <a:fld id="{D2F8B268-8E0F-4DD6-826C-55B488544B26}" type="datetimeFigureOut">
               <a:rPr lang="en-US" smtClean="0"/>
-              <a:t>3/20/2019</a:t>
+              <a:t>3/23/2019</a:t>
             </a:fld>
             <a:endParaRPr lang="en-US"/>
           </a:p>
@@ -2009,7 +2009,7 @@
           <a:p>
             <a:fld id="{D2F8B268-8E0F-4DD6-826C-55B488544B26}" type="datetimeFigureOut">
               <a:rPr lang="en-US" smtClean="0"/>
-              <a:t>3/20/2019</a:t>
+              <a:t>3/23/2019</a:t>
             </a:fld>
             <a:endParaRPr lang="en-US"/>
           </a:p>
@@ -2421,7 +2421,7 @@
           <a:p>
             <a:fld id="{D2F8B268-8E0F-4DD6-826C-55B488544B26}" type="datetimeFigureOut">
               <a:rPr lang="en-US" smtClean="0"/>
-              <a:t>3/20/2019</a:t>
+              <a:t>3/23/2019</a:t>
             </a:fld>
             <a:endParaRPr lang="en-US"/>
           </a:p>
@@ -2562,7 +2562,7 @@
           <a:p>
             <a:fld id="{D2F8B268-8E0F-4DD6-826C-55B488544B26}" type="datetimeFigureOut">
               <a:rPr lang="en-US" smtClean="0"/>
-              <a:t>3/20/2019</a:t>
+              <a:t>3/23/2019</a:t>
             </a:fld>
             <a:endParaRPr lang="en-US"/>
           </a:p>
@@ -2675,7 +2675,7 @@
           <a:p>
             <a:fld id="{D2F8B268-8E0F-4DD6-826C-55B488544B26}" type="datetimeFigureOut">
               <a:rPr lang="en-US" smtClean="0"/>
-              <a:t>3/20/2019</a:t>
+              <a:t>3/23/2019</a:t>
             </a:fld>
             <a:endParaRPr lang="en-US"/>
           </a:p>
@@ -2986,7 +2986,7 @@
           <a:p>
             <a:fld id="{D2F8B268-8E0F-4DD6-826C-55B488544B26}" type="datetimeFigureOut">
               <a:rPr lang="en-US" smtClean="0"/>
-              <a:t>3/20/2019</a:t>
+              <a:t>3/23/2019</a:t>
             </a:fld>
             <a:endParaRPr lang="en-US"/>
           </a:p>
@@ -3274,7 +3274,7 @@
           <a:p>
             <a:fld id="{D2F8B268-8E0F-4DD6-826C-55B488544B26}" type="datetimeFigureOut">
               <a:rPr lang="en-US" smtClean="0"/>
-              <a:t>3/20/2019</a:t>
+              <a:t>3/23/2019</a:t>
             </a:fld>
             <a:endParaRPr lang="en-US"/>
           </a:p>
@@ -3515,7 +3515,7 @@
           <a:p>
             <a:fld id="{D2F8B268-8E0F-4DD6-826C-55B488544B26}" type="datetimeFigureOut">
               <a:rPr lang="en-US" smtClean="0"/>
-              <a:t>3/20/2019</a:t>
+              <a:t>3/23/2019</a:t>
             </a:fld>
             <a:endParaRPr lang="en-US"/>
           </a:p>
@@ -4397,21 +4397,7 @@
                 <a:latin typeface="Segoe UI Light" panose="020B0502040204020203" pitchFamily="34" charset="0"/>
                 <a:cs typeface="Segoe UI Light" panose="020B0502040204020203" pitchFamily="34" charset="0"/>
               </a:rPr>
-              <a:t>Transient/</a:t>
-            </a:r>
-            <a:r>
-              <a:rPr lang="en-US" sz="1400" dirty="0" err="1">
-                <a:latin typeface="Segoe UI Light" panose="020B0502040204020203" pitchFamily="34" charset="0"/>
-                <a:cs typeface="Segoe UI Light" panose="020B0502040204020203" pitchFamily="34" charset="0"/>
-              </a:rPr>
-              <a:t>PerCall</a:t>
-            </a:r>
-            <a:r>
-              <a:rPr lang="en-US" sz="1400" dirty="0">
-                <a:latin typeface="Segoe UI Light" panose="020B0502040204020203" pitchFamily="34" charset="0"/>
-                <a:cs typeface="Segoe UI Light" panose="020B0502040204020203" pitchFamily="34" charset="0"/>
-              </a:rPr>
-              <a:t> is NOT an optimal approach</a:t>
+              <a:t>Transient/PerCall is NOT an optimal approach</a:t>
             </a:r>
           </a:p>
         </p:txBody>

</xml_diff>